<commit_message>
Add delay to chatbot response and update presentation
</commit_message>
<xml_diff>
--- a/Final_AICTE_PPT.pptx
+++ b/Final_AICTE_PPT.pptx
@@ -3594,7 +3594,7 @@
           </p:nvPr>
         </p:nvPicPr>
         <p:blipFill>
-          <a:blip r:embed="rId2" cstate="print">
+          <a:blip r:embed="rId2">
             <a:extLst>
               <a:ext uri="{28A0092B-C50C-407E-A947-70E740481C1C}">
                 <a14:useLocalDpi xmlns:a14="http://schemas.microsoft.com/office/drawing/2010/main" val="0"/>
@@ -3602,9 +3602,7 @@
             </a:extLst>
           </a:blip>
           <a:srcRect/>
-          <a:stretch>
-            <a:fillRect/>
-          </a:stretch>
+          <a:stretch/>
         </p:blipFill>
         <p:spPr bwMode="auto">
           <a:xfrm>
@@ -3827,7 +3825,7 @@
           </p:nvPr>
         </p:nvPicPr>
         <p:blipFill>
-          <a:blip r:embed="rId2" cstate="print">
+          <a:blip r:embed="rId2">
             <a:extLst>
               <a:ext uri="{28A0092B-C50C-407E-A947-70E740481C1C}">
                 <a14:useLocalDpi xmlns:a14="http://schemas.microsoft.com/office/drawing/2010/main" val="0"/>
@@ -3835,9 +3833,7 @@
             </a:extLst>
           </a:blip>
           <a:srcRect/>
-          <a:stretch>
-            <a:fillRect/>
-          </a:stretch>
+          <a:stretch/>
         </p:blipFill>
         <p:spPr bwMode="auto">
           <a:xfrm>
@@ -6612,7 +6608,7 @@
         </p:nvSpPr>
         <p:spPr>
           <a:xfrm>
-            <a:off x="838199" y="1929384"/>
+            <a:off x="838199" y="1899567"/>
             <a:ext cx="11108635" cy="4526914"/>
           </a:xfrm>
         </p:spPr>
@@ -13225,7 +13221,7 @@
           </p:nvPr>
         </p:nvPicPr>
         <p:blipFill>
-          <a:blip r:embed="rId2" cstate="print">
+          <a:blip r:embed="rId2">
             <a:extLst>
               <a:ext uri="{28A0092B-C50C-407E-A947-70E740481C1C}">
                 <a14:useLocalDpi xmlns:a14="http://schemas.microsoft.com/office/drawing/2010/main" val="0"/>
@@ -13233,9 +13229,7 @@
             </a:extLst>
           </a:blip>
           <a:srcRect/>
-          <a:stretch>
-            <a:fillRect/>
-          </a:stretch>
+          <a:stretch/>
         </p:blipFill>
         <p:spPr bwMode="auto">
           <a:xfrm>

</xml_diff>